<commit_message>
fix: Remove bullet point in the content
</commit_message>
<xml_diff>
--- a/chants.pptx
+++ b/chants.pptx
@@ -3154,7 +3154,11 @@
         <p:txBody>
           <a:bodyPr/>
           <a:lstStyle/>
-          <a:p/>
+          <a:p>
+            <a:r>
+              <a:t>2. Misaora an'i Zanahary</a:t>
+            </a:r>
+          </a:p>
         </p:txBody>
       </p:sp>
       <p:sp>
@@ -3172,21 +3176,37 @@
           <a:bodyPr/>
           <a:lstStyle/>
           <a:p>
+            <a:pPr>
+              <a:buNone/>
+              <a:defRPr b="0" sz="3500"/>
+            </a:pPr>
             <a:r>
               <a:t>3. Dia ampitomboy ny sainay</a:t>
             </a:r>
           </a:p>
           <a:p>
+            <a:pPr>
+              <a:buNone/>
+              <a:defRPr b="0" sz="3500"/>
+            </a:pPr>
             <a:r>
               <a:t>Hahalala ny teninao,</a:t>
             </a:r>
           </a:p>
           <a:p>
+            <a:pPr>
+              <a:buNone/>
+              <a:defRPr b="0" sz="3500"/>
+            </a:pPr>
             <a:r>
               <a:t>Hahafantatra marina</a:t>
             </a:r>
           </a:p>
           <a:p>
+            <a:pPr>
+              <a:buNone/>
+              <a:defRPr b="0" sz="3500"/>
+            </a:pPr>
             <a:r>
               <a:t>Izay sitraky ny fonao.</a:t>
             </a:r>
@@ -3264,7 +3284,11 @@
         <p:txBody>
           <a:bodyPr/>
           <a:lstStyle/>
-          <a:p/>
+          <a:p>
+            <a:r>
+              <a:t>3. Isaorana anie Andriamanitsika</a:t>
+            </a:r>
+          </a:p>
         </p:txBody>
       </p:sp>
       <p:sp>
@@ -3282,31 +3306,55 @@
           <a:bodyPr/>
           <a:lstStyle/>
           <a:p>
+            <a:pPr>
+              <a:buNone/>
+              <a:defRPr b="0" sz="3500"/>
+            </a:pPr>
             <a:r>
               <a:t>1. Isaorana anie Andriamanitsika</a:t>
             </a:r>
           </a:p>
           <a:p>
+            <a:pPr>
+              <a:buNone/>
+              <a:defRPr b="0" sz="3500"/>
+            </a:pPr>
             <a:r>
               <a:t>Fa fitahiam-be Omeny ho antsika</a:t>
             </a:r>
           </a:p>
           <a:p>
+            <a:pPr>
+              <a:buNone/>
+              <a:defRPr b="0" sz="3500"/>
+            </a:pPr>
             <a:r>
               <a:t>Hatreo ambohoka</a:t>
             </a:r>
           </a:p>
           <a:p>
+            <a:pPr>
+              <a:buNone/>
+              <a:defRPr b="0" sz="3500"/>
+            </a:pPr>
             <a:r>
               <a:t>Ka mandraka antitra,</a:t>
             </a:r>
           </a:p>
           <a:p>
+            <a:pPr>
+              <a:buNone/>
+              <a:defRPr b="0" sz="3500"/>
+            </a:pPr>
             <a:r>
               <a:t>Isika henika</a:t>
             </a:r>
           </a:p>
           <a:p>
+            <a:pPr>
+              <a:buNone/>
+              <a:defRPr b="0" sz="3500"/>
+            </a:pPr>
             <a:r>
               <a:t>Ny soan'ny lanitra</a:t>
             </a:r>
@@ -3345,7 +3393,11 @@
         <p:txBody>
           <a:bodyPr/>
           <a:lstStyle/>
-          <a:p/>
+          <a:p>
+            <a:r>
+              <a:t>3. Isaorana anie Andriamanitsika</a:t>
+            </a:r>
+          </a:p>
         </p:txBody>
       </p:sp>
       <p:sp>
@@ -3363,31 +3415,55 @@
           <a:bodyPr/>
           <a:lstStyle/>
           <a:p>
+            <a:pPr>
+              <a:buNone/>
+              <a:defRPr b="0" sz="3500"/>
+            </a:pPr>
             <a:r>
               <a:t>2. Tsy mety tapitra na lany ny hareny,</a:t>
             </a:r>
           </a:p>
           <a:p>
+            <a:pPr>
+              <a:buNone/>
+              <a:defRPr b="0" sz="3500"/>
+            </a:pPr>
             <a:r>
               <a:t>Tsy hita faritra ny sisa izay homeny;</a:t>
             </a:r>
           </a:p>
           <a:p>
+            <a:pPr>
+              <a:buNone/>
+              <a:defRPr b="0" sz="3500"/>
+            </a:pPr>
             <a:r>
               <a:t>Fanahy sambatra</a:t>
             </a:r>
           </a:p>
           <a:p>
+            <a:pPr>
+              <a:buNone/>
+              <a:defRPr b="0" sz="3500"/>
+            </a:pPr>
             <a:r>
               <a:t>Sy fo miadana</a:t>
             </a:r>
           </a:p>
           <a:p>
+            <a:pPr>
+              <a:buNone/>
+              <a:defRPr b="0" sz="3500"/>
+            </a:pPr>
             <a:r>
               <a:t>No efa santatra</a:t>
             </a:r>
           </a:p>
           <a:p>
+            <a:pPr>
+              <a:buNone/>
+              <a:defRPr b="0" sz="3500"/>
+            </a:pPr>
             <a:r>
               <a:t>Izay ananana.</a:t>
             </a:r>
@@ -3426,7 +3502,11 @@
         <p:txBody>
           <a:bodyPr/>
           <a:lstStyle/>
-          <a:p/>
+          <a:p>
+            <a:r>
+              <a:t>3. Isaorana anie Andriamanitsika</a:t>
+            </a:r>
+          </a:p>
         </p:txBody>
       </p:sp>
       <p:sp>
@@ -3444,31 +3524,55 @@
           <a:bodyPr/>
           <a:lstStyle/>
           <a:p>
+            <a:pPr>
+              <a:buNone/>
+              <a:defRPr b="0" sz="3500"/>
+            </a:pPr>
             <a:r>
               <a:t>3. Ny Ray sy Zanaka sy ny Fanahy koa,</a:t>
             </a:r>
           </a:p>
           <a:p>
+            <a:pPr>
+              <a:buNone/>
+              <a:defRPr b="0" sz="3500"/>
+            </a:pPr>
             <a:r>
               <a:t>Derain'ny masina ho Tompo iray tokoa;</a:t>
             </a:r>
           </a:p>
           <a:p>
+            <a:pPr>
+              <a:buNone/>
+              <a:defRPr b="0" sz="3500"/>
+            </a:pPr>
             <a:r>
               <a:t>Andriamanitray</a:t>
             </a:r>
           </a:p>
           <a:p>
+            <a:pPr>
+              <a:buNone/>
+              <a:defRPr b="0" sz="3500"/>
+            </a:pPr>
             <a:r>
               <a:t>Be fahasoavana</a:t>
             </a:r>
           </a:p>
           <a:p>
+            <a:pPr>
+              <a:buNone/>
+              <a:defRPr b="0" sz="3500"/>
+            </a:pPr>
             <a:r>
               <a:t>No anateranay</a:t>
             </a:r>
           </a:p>
           <a:p>
+            <a:pPr>
+              <a:buNone/>
+              <a:defRPr b="0" sz="3500"/>
+            </a:pPr>
             <a:r>
               <a:t>Izay fisaorana.</a:t>
             </a:r>
@@ -3507,7 +3611,11 @@
         <p:txBody>
           <a:bodyPr/>
           <a:lstStyle/>
-          <a:p/>
+          <a:p>
+            <a:r>
+              <a:t>1. Andriananahary masina</a:t>
+            </a:r>
+          </a:p>
         </p:txBody>
       </p:sp>
       <p:sp>
@@ -3525,21 +3633,37 @@
           <a:bodyPr/>
           <a:lstStyle/>
           <a:p>
+            <a:pPr>
+              <a:buNone/>
+              <a:defRPr b="0" sz="3500"/>
+            </a:pPr>
             <a:r>
               <a:t>1. Andriananahary masina indrindra!</a:t>
             </a:r>
           </a:p>
           <a:p>
+            <a:pPr>
+              <a:buNone/>
+              <a:defRPr b="0" sz="3500"/>
+            </a:pPr>
             <a:r>
               <a:t>Ny anjelinao izay mitoetra Aminao</a:t>
             </a:r>
           </a:p>
           <a:p>
+            <a:pPr>
+              <a:buNone/>
+              <a:defRPr b="0" sz="3500"/>
+            </a:pPr>
             <a:r>
               <a:t>Mifamaly hoe : Masina indrindra</a:t>
             </a:r>
           </a:p>
           <a:p>
+            <a:pPr>
+              <a:buNone/>
+              <a:defRPr b="0" sz="3500"/>
+            </a:pPr>
             <a:r>
               <a:t>Andriananahary, Telo Izay Iray.</a:t>
             </a:r>
@@ -3578,7 +3702,11 @@
         <p:txBody>
           <a:bodyPr/>
           <a:lstStyle/>
-          <a:p/>
+          <a:p>
+            <a:r>
+              <a:t>1. Andriananahary masina</a:t>
+            </a:r>
+          </a:p>
         </p:txBody>
       </p:sp>
       <p:sp>
@@ -3596,21 +3724,37 @@
           <a:bodyPr/>
           <a:lstStyle/>
           <a:p>
+            <a:pPr>
+              <a:buNone/>
+              <a:defRPr b="0" sz="3500"/>
+            </a:pPr>
             <a:r>
               <a:t>2. Andriananahary masina indrindra!</a:t>
             </a:r>
           </a:p>
           <a:p>
+            <a:pPr>
+              <a:buNone/>
+              <a:defRPr b="0" sz="3500"/>
+            </a:pPr>
             <a:r>
               <a:t>Na tsy hita aza izao ny voninahitrao!</a:t>
             </a:r>
           </a:p>
           <a:p>
+            <a:pPr>
+              <a:buNone/>
+              <a:defRPr b="0" sz="3500"/>
+            </a:pPr>
             <a:r>
               <a:t>Masina indrindra Hianao irery.</a:t>
             </a:r>
           </a:p>
           <a:p>
+            <a:pPr>
+              <a:buNone/>
+              <a:defRPr b="0" sz="3500"/>
+            </a:pPr>
             <a:r>
               <a:t>Andriananahary, Telo Izay Iray.</a:t>
             </a:r>
@@ -3649,7 +3793,11 @@
         <p:txBody>
           <a:bodyPr/>
           <a:lstStyle/>
-          <a:p/>
+          <a:p>
+            <a:r>
+              <a:t>1. Andriananahary masina</a:t>
+            </a:r>
+          </a:p>
         </p:txBody>
       </p:sp>
       <p:sp>
@@ -3667,26 +3815,46 @@
           <a:bodyPr/>
           <a:lstStyle/>
           <a:p>
+            <a:pPr>
+              <a:buNone/>
+              <a:defRPr b="0" sz="3500"/>
+            </a:pPr>
             <a:r>
               <a:t>3. Zava-manana aina samy mankalaza</a:t>
             </a:r>
           </a:p>
           <a:p>
+            <a:pPr>
+              <a:buNone/>
+              <a:defRPr b="0" sz="3500"/>
+            </a:pPr>
             <a:r>
               <a:t>Sady manambara Anao Izay Tompony</a:t>
             </a:r>
           </a:p>
           <a:p>
+            <a:pPr>
+              <a:buNone/>
+              <a:defRPr b="0" sz="3500"/>
+            </a:pPr>
             <a:r>
               <a:t>izao;</a:t>
             </a:r>
           </a:p>
           <a:p>
+            <a:pPr>
+              <a:buNone/>
+              <a:defRPr b="0" sz="3500"/>
+            </a:pPr>
             <a:r>
               <a:t>Hianao irery no mitahy azy,</a:t>
             </a:r>
           </a:p>
           <a:p>
+            <a:pPr>
+              <a:buNone/>
+              <a:defRPr b="0" sz="3500"/>
+            </a:pPr>
             <a:r>
               <a:t>Andriananahary, Telo Izay Iray.</a:t>
             </a:r>
@@ -3725,7 +3893,11 @@
         <p:txBody>
           <a:bodyPr/>
           <a:lstStyle/>
-          <a:p/>
+          <a:p>
+            <a:r>
+              <a:t>1. Andriananahary masina</a:t>
+            </a:r>
+          </a:p>
         </p:txBody>
       </p:sp>
       <p:sp>
@@ -3743,21 +3915,37 @@
           <a:bodyPr/>
           <a:lstStyle/>
           <a:p>
+            <a:pPr>
+              <a:buNone/>
+              <a:defRPr b="0" sz="3500"/>
+            </a:pPr>
             <a:r>
               <a:t>4. Andriananahary feno hatsarana!</a:t>
             </a:r>
           </a:p>
           <a:p>
+            <a:pPr>
+              <a:buNone/>
+              <a:defRPr b="0" sz="3500"/>
+            </a:pPr>
             <a:r>
               <a:t>He ny fitahianao izay mpanomponao.</a:t>
             </a:r>
           </a:p>
           <a:p>
+            <a:pPr>
+              <a:buNone/>
+              <a:defRPr b="0" sz="3500"/>
+            </a:pPr>
             <a:r>
               <a:t>Tsara dia tsara ny omenao azy</a:t>
             </a:r>
           </a:p>
           <a:p>
+            <a:pPr>
+              <a:buNone/>
+              <a:defRPr b="0" sz="3500"/>
+            </a:pPr>
             <a:r>
               <a:t>Andriananahary, Telo Izay Iray.</a:t>
             </a:r>
@@ -3796,7 +3984,11 @@
         <p:txBody>
           <a:bodyPr/>
           <a:lstStyle/>
-          <a:p/>
+          <a:p>
+            <a:r>
+              <a:t>1. Andriananahary masina</a:t>
+            </a:r>
+          </a:p>
         </p:txBody>
       </p:sp>
       <p:sp>
@@ -3814,26 +4006,46 @@
           <a:bodyPr/>
           <a:lstStyle/>
           <a:p>
+            <a:pPr>
+              <a:buNone/>
+              <a:defRPr b="0" sz="3500"/>
+            </a:pPr>
             <a:r>
               <a:t>5. Andriananahary masina indrindra!</a:t>
             </a:r>
           </a:p>
           <a:p>
+            <a:pPr>
+              <a:buNone/>
+              <a:defRPr b="0" sz="3500"/>
+            </a:pPr>
             <a:r>
               <a:t>Izahay mpanomponao ta-hankalaza</a:t>
             </a:r>
           </a:p>
           <a:p>
+            <a:pPr>
+              <a:buNone/>
+              <a:defRPr b="0" sz="3500"/>
+            </a:pPr>
             <a:r>
               <a:t>Anao;</a:t>
             </a:r>
           </a:p>
           <a:p>
+            <a:pPr>
+              <a:buNone/>
+              <a:defRPr b="0" sz="3500"/>
+            </a:pPr>
             <a:r>
               <a:t>Feno fahendrena, feno fiantrana,</a:t>
             </a:r>
           </a:p>
           <a:p>
+            <a:pPr>
+              <a:buNone/>
+              <a:defRPr b="0" sz="3500"/>
+            </a:pPr>
             <a:r>
               <a:t>Andriananahary, Telo Izay Iray.</a:t>
             </a:r>
@@ -3911,7 +4123,11 @@
         <p:txBody>
           <a:bodyPr/>
           <a:lstStyle/>
-          <a:p/>
+          <a:p>
+            <a:r>
+              <a:t>2. Misaora an'i Zanahary</a:t>
+            </a:r>
+          </a:p>
         </p:txBody>
       </p:sp>
       <p:sp>
@@ -3929,21 +4145,37 @@
           <a:bodyPr/>
           <a:lstStyle/>
           <a:p>
+            <a:pPr>
+              <a:buNone/>
+              <a:defRPr b="0" sz="3500"/>
+            </a:pPr>
             <a:r>
               <a:t>1. Misaora an'i Zanahary</a:t>
             </a:r>
           </a:p>
           <a:p>
+            <a:pPr>
+              <a:buNone/>
+              <a:defRPr b="0" sz="3500"/>
+            </a:pPr>
             <a:r>
               <a:t>'Zao olona tontolo izao;</a:t>
             </a:r>
           </a:p>
           <a:p>
+            <a:pPr>
+              <a:buNone/>
+              <a:defRPr b="0" sz="3500"/>
+            </a:pPr>
             <a:r>
               <a:t>Dia mankalazà Azy,</a:t>
             </a:r>
           </a:p>
           <a:p>
+            <a:pPr>
+              <a:buNone/>
+              <a:defRPr b="0" sz="3500"/>
+            </a:pPr>
             <a:r>
               <a:t>Fa anton'izao rehetra izao</a:t>
             </a:r>
@@ -3982,7 +4214,11 @@
         <p:txBody>
           <a:bodyPr/>
           <a:lstStyle/>
-          <a:p/>
+          <a:p>
+            <a:r>
+              <a:t>2. Misaora an'i Zanahary</a:t>
+            </a:r>
+          </a:p>
         </p:txBody>
       </p:sp>
       <p:sp>
@@ -4000,21 +4236,37 @@
           <a:bodyPr/>
           <a:lstStyle/>
           <a:p>
+            <a:pPr>
+              <a:buNone/>
+              <a:defRPr b="0" sz="3500"/>
+            </a:pPr>
             <a:r>
               <a:t>2. Izay zavatra nomeny</a:t>
             </a:r>
           </a:p>
           <a:p>
+            <a:pPr>
+              <a:buNone/>
+              <a:defRPr b="0" sz="3500"/>
+            </a:pPr>
             <a:r>
               <a:t>Mahafaly, mahasoa;</a:t>
             </a:r>
           </a:p>
           <a:p>
+            <a:pPr>
+              <a:buNone/>
+              <a:defRPr b="0" sz="3500"/>
+            </a:pPr>
             <a:r>
               <a:t>Toy ny andro fararano,</a:t>
             </a:r>
           </a:p>
           <a:p>
+            <a:pPr>
+              <a:buNone/>
+              <a:defRPr b="0" sz="3500"/>
+            </a:pPr>
             <a:r>
               <a:t>Toy ny andro mipoaka.</a:t>
             </a:r>

</xml_diff>